<commit_message>
Documentation changes - Updated Birds Adventure Report
</commit_message>
<xml_diff>
--- a/Documentation/BIRD ADVENTURE APP - Weekly Tasks.pptx
+++ b/Documentation/BIRD ADVENTURE APP - Weekly Tasks.pptx
@@ -5,26 +5,27 @@
     <p:sldMasterId id="2147483663" r:id="rId1"/>
   </p:sldMasterIdLst>
   <p:notesMasterIdLst>
-    <p:notesMasterId r:id="rId5"/>
+    <p:notesMasterId r:id="rId6"/>
   </p:notesMasterIdLst>
   <p:sldIdLst>
     <p:sldId id="256" r:id="rId2"/>
     <p:sldId id="257" r:id="rId3"/>
     <p:sldId id="258" r:id="rId4"/>
+    <p:sldId id="259" r:id="rId5"/>
   </p:sldIdLst>
   <p:sldSz cx="12192000" cy="6858000"/>
   <p:notesSz cx="6858000" cy="9144000"/>
   <p:embeddedFontLst>
     <p:embeddedFont>
       <p:font typeface="Century Gothic" panose="020B0502020202020204" pitchFamily="34" charset="0"/>
-      <p:regular r:id="rId6"/>
-      <p:bold r:id="rId7"/>
-      <p:italic r:id="rId8"/>
-      <p:boldItalic r:id="rId9"/>
+      <p:regular r:id="rId7"/>
+      <p:bold r:id="rId8"/>
+      <p:italic r:id="rId9"/>
+      <p:boldItalic r:id="rId10"/>
     </p:embeddedFont>
     <p:embeddedFont>
       <p:font typeface="Wingdings 3" panose="05040102010807070707" pitchFamily="18" charset="2"/>
-      <p:regular r:id="rId10"/>
+      <p:regular r:id="rId11"/>
     </p:embeddedFont>
   </p:embeddedFontLst>
   <p:defaultTextStyle>
@@ -123,8 +124,11 @@
     </a:lvl9pPr>
   </p:defaultTextStyle>
   <p:extLst>
+    <p:ext uri="{EFAFB233-063F-42B5-8137-9DF3F51BA10A}">
+      <p15:sldGuideLst xmlns:p15="http://schemas.microsoft.com/office/powerpoint/2012/main"/>
+    </p:ext>
     <p:ext uri="http://customooxmlschemas.google.com/">
-      <go:slidesCustomData xmlns:go="http://customooxmlschemas.google.com/" xmlns:p15="http://schemas.microsoft.com/office/powerpoint/2012/main" xmlns:p14="http://schemas.microsoft.com/office/powerpoint/2010/main" xmlns:com="http://schemas.openxmlformats.org/drawingml/2006/compatibility" xmlns:pvml="urn:schemas-microsoft-com:office:powerpoint" xmlns:v="urn:schemas-microsoft-com:vml" xmlns:o="urn:schemas-microsoft-com:office:office" xmlns:dgm="http://schemas.openxmlformats.org/drawingml/2006/diagram" xmlns:c="http://schemas.openxmlformats.org/drawingml/2006/chart" xmlns:mv="urn:schemas-microsoft-com:mac:vml" xmlns:mc="http://schemas.openxmlformats.org/markup-compatibility/2006" xmlns="" r:id="rId12" roundtripDataSignature="AMtx7mh37Uwqrkw6WJihnRWBT8HFuYSgmA=="/>
+      <go:slidesCustomData xmlns="" xmlns:mc="http://schemas.openxmlformats.org/markup-compatibility/2006" xmlns:mv="urn:schemas-microsoft-com:mac:vml" xmlns:c="http://schemas.openxmlformats.org/drawingml/2006/chart" xmlns:dgm="http://schemas.openxmlformats.org/drawingml/2006/diagram" xmlns:o="urn:schemas-microsoft-com:office:office" xmlns:v="urn:schemas-microsoft-com:vml" xmlns:pvml="urn:schemas-microsoft-com:office:powerpoint" xmlns:com="http://schemas.openxmlformats.org/drawingml/2006/compatibility" xmlns:p14="http://schemas.microsoft.com/office/powerpoint/2010/main" xmlns:p15="http://schemas.microsoft.com/office/powerpoint/2012/main" xmlns:go="http://customooxmlschemas.google.com/" r:id="rId12" roundtripDataSignature="AMtx7mh37Uwqrkw6WJihnRWBT8HFuYSgmA=="/>
     </p:ext>
   </p:extLst>
 </p:presentation>
@@ -879,6 +883,115 @@
     <p:extLst>
       <p:ext uri="{BB962C8B-B14F-4D97-AF65-F5344CB8AC3E}">
         <p14:creationId xmlns:p14="http://schemas.microsoft.com/office/powerpoint/2010/main" val="4068667487"/>
+      </p:ext>
+    </p:extLst>
+  </p:cSld>
+  <p:clrMapOvr>
+    <a:masterClrMapping/>
+  </p:clrMapOvr>
+</p:notes>
+</file>
+
+<file path=ppt/notesSlides/notesSlide4.xml><?xml version="1.0" encoding="utf-8"?>
+<p:notes xmlns:a="http://schemas.openxmlformats.org/drawingml/2006/main" xmlns:r="http://schemas.openxmlformats.org/officeDocument/2006/relationships" xmlns:p="http://schemas.openxmlformats.org/presentationml/2006/main" showMasterSp="0" showMasterPhAnim="0">
+  <p:cSld>
+    <p:spTree>
+      <p:nvGrpSpPr>
+        <p:cNvPr id="1" name="Shape 118"/>
+        <p:cNvGrpSpPr/>
+        <p:nvPr/>
+      </p:nvGrpSpPr>
+      <p:grpSpPr>
+        <a:xfrm>
+          <a:off x="0" y="0"/>
+          <a:ext cx="0" cy="0"/>
+          <a:chOff x="0" y="0"/>
+          <a:chExt cx="0" cy="0"/>
+        </a:xfrm>
+      </p:grpSpPr>
+      <p:sp>
+        <p:nvSpPr>
+          <p:cNvPr id="119" name="Google Shape;119;p2:notes"/>
+          <p:cNvSpPr txBox="1">
+            <a:spLocks noGrp="1"/>
+          </p:cNvSpPr>
+          <p:nvPr>
+            <p:ph type="body" idx="1"/>
+          </p:nvPr>
+        </p:nvSpPr>
+        <p:spPr>
+          <a:xfrm>
+            <a:off x="685800" y="4343400"/>
+            <a:ext cx="5486400" cy="4114800"/>
+          </a:xfrm>
+          <a:prstGeom prst="rect">
+            <a:avLst/>
+          </a:prstGeom>
+        </p:spPr>
+        <p:txBody>
+          <a:bodyPr spcFirstLastPara="1" wrap="square" lIns="91425" tIns="91425" rIns="91425" bIns="91425" anchor="t" anchorCtr="0">
+            <a:noAutofit/>
+          </a:bodyPr>
+          <a:lstStyle/>
+          <a:p>
+            <a:pPr marL="0" lvl="0" indent="0" algn="l" rtl="0">
+              <a:spcBef>
+                <a:spcPts val="0"/>
+              </a:spcBef>
+              <a:spcAft>
+                <a:spcPts val="0"/>
+              </a:spcAft>
+              <a:buNone/>
+            </a:pPr>
+            <a:endParaRPr/>
+          </a:p>
+        </p:txBody>
+      </p:sp>
+      <p:sp>
+        <p:nvSpPr>
+          <p:cNvPr id="120" name="Google Shape;120;p2:notes"/>
+          <p:cNvSpPr>
+            <a:spLocks noGrp="1" noRot="1" noChangeAspect="1"/>
+          </p:cNvSpPr>
+          <p:nvPr>
+            <p:ph type="sldImg" idx="2"/>
+          </p:nvPr>
+        </p:nvSpPr>
+        <p:spPr>
+          <a:xfrm>
+            <a:off x="381000" y="685800"/>
+            <a:ext cx="6096000" cy="3429000"/>
+          </a:xfrm>
+          <a:custGeom>
+            <a:avLst/>
+            <a:gdLst/>
+            <a:ahLst/>
+            <a:cxnLst/>
+            <a:rect l="l" t="t" r="r" b="b"/>
+            <a:pathLst>
+              <a:path w="120000" h="120000" extrusionOk="0">
+                <a:moveTo>
+                  <a:pt x="0" y="0"/>
+                </a:moveTo>
+                <a:lnTo>
+                  <a:pt x="120000" y="0"/>
+                </a:lnTo>
+                <a:lnTo>
+                  <a:pt x="120000" y="120000"/>
+                </a:lnTo>
+                <a:lnTo>
+                  <a:pt x="0" y="120000"/>
+                </a:lnTo>
+                <a:close/>
+              </a:path>
+            </a:pathLst>
+          </a:custGeom>
+        </p:spPr>
+      </p:sp>
+    </p:spTree>
+    <p:extLst>
+      <p:ext uri="{BB962C8B-B14F-4D97-AF65-F5344CB8AC3E}">
+        <p14:creationId xmlns:p14="http://schemas.microsoft.com/office/powerpoint/2010/main" val="1690308119"/>
       </p:ext>
     </p:extLst>
   </p:cSld>
@@ -8920,6 +9033,926 @@
     <p:extLst>
       <p:ext uri="{BB962C8B-B14F-4D97-AF65-F5344CB8AC3E}">
         <p14:creationId xmlns:p14="http://schemas.microsoft.com/office/powerpoint/2010/main" val="3983065084"/>
+      </p:ext>
+    </p:extLst>
+  </p:cSld>
+  <p:clrMapOvr>
+    <a:masterClrMapping/>
+  </p:clrMapOvr>
+</p:sld>
+</file>
+
+<file path=ppt/slides/slide4.xml><?xml version="1.0" encoding="utf-8"?>
+<p:sld xmlns:a="http://schemas.openxmlformats.org/drawingml/2006/main" xmlns:r="http://schemas.openxmlformats.org/officeDocument/2006/relationships" xmlns:p="http://schemas.openxmlformats.org/presentationml/2006/main">
+  <p:cSld>
+    <p:spTree>
+      <p:nvGrpSpPr>
+        <p:cNvPr id="1" name="Shape 121"/>
+        <p:cNvGrpSpPr/>
+        <p:nvPr/>
+      </p:nvGrpSpPr>
+      <p:grpSpPr>
+        <a:xfrm>
+          <a:off x="0" y="0"/>
+          <a:ext cx="0" cy="0"/>
+          <a:chOff x="0" y="0"/>
+          <a:chExt cx="0" cy="0"/>
+        </a:xfrm>
+      </p:grpSpPr>
+      <p:sp>
+        <p:nvSpPr>
+          <p:cNvPr id="122" name="Google Shape;122;p2"/>
+          <p:cNvSpPr txBox="1">
+            <a:spLocks noGrp="1"/>
+          </p:cNvSpPr>
+          <p:nvPr>
+            <p:ph type="title"/>
+          </p:nvPr>
+        </p:nvSpPr>
+        <p:spPr>
+          <a:xfrm>
+            <a:off x="905463" y="243648"/>
+            <a:ext cx="10571998" cy="970450"/>
+          </a:xfrm>
+          <a:prstGeom prst="rect">
+            <a:avLst/>
+          </a:prstGeom>
+          <a:noFill/>
+          <a:ln>
+            <a:noFill/>
+          </a:ln>
+          <a:effectLst>
+            <a:outerShdw blurRad="50800">
+              <a:srgbClr val="000000">
+                <a:alpha val="60000"/>
+              </a:srgbClr>
+            </a:outerShdw>
+          </a:effectLst>
+        </p:spPr>
+        <p:txBody>
+          <a:bodyPr spcFirstLastPara="1" wrap="square" lIns="91425" tIns="45700" rIns="91425" bIns="45700" anchor="b" anchorCtr="0">
+            <a:noAutofit/>
+          </a:bodyPr>
+          <a:lstStyle/>
+          <a:p>
+            <a:pPr marL="0" lvl="0" indent="0" algn="l" rtl="0">
+              <a:spcBef>
+                <a:spcPts val="0"/>
+              </a:spcBef>
+              <a:spcAft>
+                <a:spcPts val="0"/>
+              </a:spcAft>
+              <a:buClr>
+                <a:srgbClr val="FEFEFE"/>
+              </a:buClr>
+              <a:buSzPts val="4000"/>
+              <a:buFont typeface="Century Gothic"/>
+              <a:buNone/>
+            </a:pPr>
+            <a:r>
+              <a:rPr lang="en-US" dirty="0"/>
+              <a:t>WEEK 3 Report</a:t>
+            </a:r>
+            <a:endParaRPr dirty="0"/>
+          </a:p>
+        </p:txBody>
+      </p:sp>
+      <p:graphicFrame>
+        <p:nvGraphicFramePr>
+          <p:cNvPr id="5" name="Table 5">
+            <a:extLst>
+              <a:ext uri="{FF2B5EF4-FFF2-40B4-BE49-F238E27FC236}">
+                <a16:creationId xmlns:a16="http://schemas.microsoft.com/office/drawing/2014/main" id="{FEFDBD90-37C0-4637-A6AB-F91A2816C1E1}"/>
+              </a:ext>
+            </a:extLst>
+          </p:cNvPr>
+          <p:cNvGraphicFramePr>
+            <a:graphicFrameLocks noGrp="1"/>
+          </p:cNvGraphicFramePr>
+          <p:nvPr>
+            <p:extLst>
+              <p:ext uri="{D42A27DB-BD31-4B8C-83A1-F6EECF244321}">
+                <p14:modId xmlns:p14="http://schemas.microsoft.com/office/powerpoint/2010/main" val="2322396971"/>
+              </p:ext>
+            </p:extLst>
+          </p:nvPr>
+        </p:nvGraphicFramePr>
+        <p:xfrm>
+          <a:off x="1127026" y="1681201"/>
+          <a:ext cx="9355580" cy="4446219"/>
+        </p:xfrm>
+        <a:graphic>
+          <a:graphicData uri="http://schemas.openxmlformats.org/drawingml/2006/table">
+            <a:tbl>
+              <a:tblPr firstRow="1" bandRow="1">
+                <a:tableStyleId>{7C42F01C-ACB5-4336-8C9F-B70077CE1581}</a:tableStyleId>
+              </a:tblPr>
+              <a:tblGrid>
+                <a:gridCol w="2338895">
+                  <a:extLst>
+                    <a:ext uri="{9D8B030D-6E8A-4147-A177-3AD203B41FA5}">
+                      <a16:colId xmlns:a16="http://schemas.microsoft.com/office/drawing/2014/main" val="286820327"/>
+                    </a:ext>
+                  </a:extLst>
+                </a:gridCol>
+                <a:gridCol w="2338895">
+                  <a:extLst>
+                    <a:ext uri="{9D8B030D-6E8A-4147-A177-3AD203B41FA5}">
+                      <a16:colId xmlns:a16="http://schemas.microsoft.com/office/drawing/2014/main" val="2793457910"/>
+                    </a:ext>
+                  </a:extLst>
+                </a:gridCol>
+                <a:gridCol w="2338895">
+                  <a:extLst>
+                    <a:ext uri="{9D8B030D-6E8A-4147-A177-3AD203B41FA5}">
+                      <a16:colId xmlns:a16="http://schemas.microsoft.com/office/drawing/2014/main" val="2539028869"/>
+                    </a:ext>
+                  </a:extLst>
+                </a:gridCol>
+                <a:gridCol w="2338895">
+                  <a:extLst>
+                    <a:ext uri="{9D8B030D-6E8A-4147-A177-3AD203B41FA5}">
+                      <a16:colId xmlns:a16="http://schemas.microsoft.com/office/drawing/2014/main" val="3052471805"/>
+                    </a:ext>
+                  </a:extLst>
+                </a:gridCol>
+              </a:tblGrid>
+              <a:tr h="659867">
+                <a:tc>
+                  <a:txBody>
+                    <a:bodyPr/>
+                    <a:lstStyle/>
+                    <a:p>
+                      <a:pPr marL="0" marR="0" lvl="0" indent="0" algn="l" rtl="0">
+                        <a:spcBef>
+                          <a:spcPts val="0"/>
+                        </a:spcBef>
+                        <a:spcAft>
+                          <a:spcPts val="0"/>
+                        </a:spcAft>
+                        <a:buNone/>
+                      </a:pPr>
+                      <a:r>
+                        <a:rPr lang="en-US" sz="1800" u="none" strike="noStrike" cap="none" dirty="0"/>
+                        <a:t>TASK</a:t>
+                      </a:r>
+                      <a:endParaRPr sz="1800" dirty="0"/>
+                    </a:p>
+                  </a:txBody>
+                  <a:tcPr marL="91450" marR="91450" marT="45725" marB="45725"/>
+                </a:tc>
+                <a:tc>
+                  <a:txBody>
+                    <a:bodyPr/>
+                    <a:lstStyle/>
+                    <a:p>
+                      <a:pPr marL="0" marR="0" lvl="0" indent="0" algn="l" rtl="0">
+                        <a:spcBef>
+                          <a:spcPts val="0"/>
+                        </a:spcBef>
+                        <a:spcAft>
+                          <a:spcPts val="0"/>
+                        </a:spcAft>
+                        <a:buNone/>
+                      </a:pPr>
+                      <a:r>
+                        <a:rPr lang="en-US" sz="1800"/>
+                        <a:t>Status</a:t>
+                      </a:r>
+                      <a:endParaRPr sz="1800"/>
+                    </a:p>
+                  </a:txBody>
+                  <a:tcPr marL="91450" marR="91450" marT="45725" marB="45725"/>
+                </a:tc>
+                <a:tc>
+                  <a:txBody>
+                    <a:bodyPr/>
+                    <a:lstStyle/>
+                    <a:p>
+                      <a:pPr marL="0" marR="0" lvl="0" indent="0" algn="l" rtl="0">
+                        <a:spcBef>
+                          <a:spcPts val="0"/>
+                        </a:spcBef>
+                        <a:spcAft>
+                          <a:spcPts val="0"/>
+                        </a:spcAft>
+                        <a:buNone/>
+                      </a:pPr>
+                      <a:r>
+                        <a:rPr lang="en-US" sz="1800"/>
+                        <a:t>Remarks</a:t>
+                      </a:r>
+                      <a:endParaRPr sz="1800"/>
+                    </a:p>
+                  </a:txBody>
+                  <a:tcPr marL="91450" marR="91450" marT="45725" marB="45725"/>
+                </a:tc>
+                <a:tc>
+                  <a:txBody>
+                    <a:bodyPr/>
+                    <a:lstStyle/>
+                    <a:p>
+                      <a:pPr marL="0" marR="0" lvl="0" indent="0" algn="l" rtl="0">
+                        <a:spcBef>
+                          <a:spcPts val="0"/>
+                        </a:spcBef>
+                        <a:spcAft>
+                          <a:spcPts val="0"/>
+                        </a:spcAft>
+                        <a:buNone/>
+                      </a:pPr>
+                      <a:r>
+                        <a:rPr lang="en-US" sz="1800" dirty="0"/>
+                        <a:t>Teacher Remarks</a:t>
+                      </a:r>
+                      <a:endParaRPr sz="1800" dirty="0"/>
+                    </a:p>
+                  </a:txBody>
+                  <a:tcPr marL="91450" marR="91450" marT="45725" marB="45725"/>
+                </a:tc>
+                <a:extLst>
+                  <a:ext uri="{0D108BD9-81ED-4DB2-BD59-A6C34878D82A}">
+                    <a16:rowId xmlns:a16="http://schemas.microsoft.com/office/drawing/2014/main" val="2930710408"/>
+                  </a:ext>
+                </a:extLst>
+              </a:tr>
+              <a:tr h="659867">
+                <a:tc>
+                  <a:txBody>
+                    <a:bodyPr/>
+                    <a:lstStyle/>
+                    <a:p>
+                      <a:pPr marL="0" marR="0" lvl="0" indent="0" algn="l" rtl="0">
+                        <a:spcBef>
+                          <a:spcPts val="0"/>
+                        </a:spcBef>
+                        <a:spcAft>
+                          <a:spcPts val="0"/>
+                        </a:spcAft>
+                        <a:buNone/>
+                      </a:pPr>
+                      <a:r>
+                        <a:rPr lang="en-US" sz="1800" dirty="0"/>
+                        <a:t>Use Case Diagrams</a:t>
+                      </a:r>
+                    </a:p>
+                  </a:txBody>
+                  <a:tcPr marL="91450" marR="91450" marT="45725" marB="45725"/>
+                </a:tc>
+                <a:tc>
+                  <a:txBody>
+                    <a:bodyPr/>
+                    <a:lstStyle/>
+                    <a:p>
+                      <a:pPr marL="0" marR="0" lvl="0" indent="0" algn="l" rtl="0">
+                        <a:spcBef>
+                          <a:spcPts val="0"/>
+                        </a:spcBef>
+                        <a:spcAft>
+                          <a:spcPts val="0"/>
+                        </a:spcAft>
+                        <a:buNone/>
+                      </a:pPr>
+                      <a:r>
+                        <a:rPr lang="en-US" sz="1800"/>
+                        <a:t>Completed</a:t>
+                      </a:r>
+                      <a:endParaRPr sz="1800"/>
+                    </a:p>
+                  </a:txBody>
+                  <a:tcPr marL="91450" marR="91450" marT="45725" marB="45725"/>
+                </a:tc>
+                <a:tc>
+                  <a:txBody>
+                    <a:bodyPr/>
+                    <a:lstStyle/>
+                    <a:p>
+                      <a:pPr marL="0" marR="0" lvl="0" indent="0" algn="l" rtl="0">
+                        <a:spcBef>
+                          <a:spcPts val="0"/>
+                        </a:spcBef>
+                        <a:spcAft>
+                          <a:spcPts val="0"/>
+                        </a:spcAft>
+                        <a:buNone/>
+                      </a:pPr>
+                      <a:r>
+                        <a:rPr lang="en-CA" sz="1800" dirty="0"/>
+                        <a:t>Group Meeting</a:t>
+                      </a:r>
+                      <a:endParaRPr sz="1800" dirty="0"/>
+                    </a:p>
+                  </a:txBody>
+                  <a:tcPr marL="91450" marR="91450" marT="45725" marB="45725"/>
+                </a:tc>
+                <a:tc>
+                  <a:txBody>
+                    <a:bodyPr/>
+                    <a:lstStyle/>
+                    <a:p>
+                      <a:pPr marL="0" marR="0" lvl="0" indent="0" algn="l" rtl="0">
+                        <a:spcBef>
+                          <a:spcPts val="0"/>
+                        </a:spcBef>
+                        <a:spcAft>
+                          <a:spcPts val="0"/>
+                        </a:spcAft>
+                        <a:buNone/>
+                      </a:pPr>
+                      <a:endParaRPr sz="1800" dirty="0"/>
+                    </a:p>
+                  </a:txBody>
+                  <a:tcPr marL="91450" marR="91450" marT="45725" marB="45725"/>
+                </a:tc>
+                <a:extLst>
+                  <a:ext uri="{0D108BD9-81ED-4DB2-BD59-A6C34878D82A}">
+                    <a16:rowId xmlns:a16="http://schemas.microsoft.com/office/drawing/2014/main" val="3987877661"/>
+                  </a:ext>
+                </a:extLst>
+              </a:tr>
+              <a:tr h="659867">
+                <a:tc>
+                  <a:txBody>
+                    <a:bodyPr/>
+                    <a:lstStyle/>
+                    <a:p>
+                      <a:pPr marL="0" marR="0" lvl="0" indent="0" algn="l" rtl="0">
+                        <a:spcBef>
+                          <a:spcPts val="0"/>
+                        </a:spcBef>
+                        <a:spcAft>
+                          <a:spcPts val="0"/>
+                        </a:spcAft>
+                        <a:buNone/>
+                      </a:pPr>
+                      <a:r>
+                        <a:rPr lang="en-US" sz="1800" dirty="0"/>
+                        <a:t>Use Case  Scenarios</a:t>
+                      </a:r>
+                      <a:endParaRPr dirty="0"/>
+                    </a:p>
+                  </a:txBody>
+                  <a:tcPr marL="91450" marR="91450" marT="45725" marB="45725"/>
+                </a:tc>
+                <a:tc>
+                  <a:txBody>
+                    <a:bodyPr/>
+                    <a:lstStyle/>
+                    <a:p>
+                      <a:pPr marL="0" marR="0" lvl="0" indent="0" algn="l" rtl="0">
+                        <a:spcBef>
+                          <a:spcPts val="0"/>
+                        </a:spcBef>
+                        <a:spcAft>
+                          <a:spcPts val="0"/>
+                        </a:spcAft>
+                        <a:buNone/>
+                      </a:pPr>
+                      <a:r>
+                        <a:rPr lang="en-US" sz="1800" dirty="0"/>
+                        <a:t>Completed </a:t>
+                      </a:r>
+                      <a:endParaRPr sz="1800" dirty="0"/>
+                    </a:p>
+                  </a:txBody>
+                  <a:tcPr marL="91450" marR="91450" marT="45725" marB="45725"/>
+                </a:tc>
+                <a:tc>
+                  <a:txBody>
+                    <a:bodyPr/>
+                    <a:lstStyle/>
+                    <a:p>
+                      <a:pPr marL="0" marR="0" lvl="0" indent="0" algn="l" rtl="0">
+                        <a:spcBef>
+                          <a:spcPts val="0"/>
+                        </a:spcBef>
+                        <a:spcAft>
+                          <a:spcPts val="0"/>
+                        </a:spcAft>
+                        <a:buNone/>
+                      </a:pPr>
+                      <a:r>
+                        <a:rPr lang="en-CA" sz="1800" dirty="0"/>
+                        <a:t>Group Meeting</a:t>
+                      </a:r>
+                    </a:p>
+                  </a:txBody>
+                  <a:tcPr marL="91450" marR="91450" marT="45725" marB="45725"/>
+                </a:tc>
+                <a:tc>
+                  <a:txBody>
+                    <a:bodyPr/>
+                    <a:lstStyle/>
+                    <a:p>
+                      <a:pPr marL="0" marR="0" lvl="0" indent="0" algn="l" rtl="0">
+                        <a:spcBef>
+                          <a:spcPts val="0"/>
+                        </a:spcBef>
+                        <a:spcAft>
+                          <a:spcPts val="0"/>
+                        </a:spcAft>
+                        <a:buNone/>
+                      </a:pPr>
+                      <a:endParaRPr sz="1800"/>
+                    </a:p>
+                  </a:txBody>
+                  <a:tcPr marL="91450" marR="91450" marT="45725" marB="45725"/>
+                </a:tc>
+                <a:extLst>
+                  <a:ext uri="{0D108BD9-81ED-4DB2-BD59-A6C34878D82A}">
+                    <a16:rowId xmlns:a16="http://schemas.microsoft.com/office/drawing/2014/main" val="2468586349"/>
+                  </a:ext>
+                </a:extLst>
+              </a:tr>
+              <a:tr h="382298">
+                <a:tc>
+                  <a:txBody>
+                    <a:bodyPr/>
+                    <a:lstStyle/>
+                    <a:p>
+                      <a:pPr marL="0" marR="0" lvl="0" indent="0" algn="l" rtl="0">
+                        <a:spcBef>
+                          <a:spcPts val="0"/>
+                        </a:spcBef>
+                        <a:spcAft>
+                          <a:spcPts val="0"/>
+                        </a:spcAft>
+                        <a:buNone/>
+                      </a:pPr>
+                      <a:r>
+                        <a:rPr lang="en-US" sz="1800" dirty="0"/>
+                        <a:t>Class Diagram</a:t>
+                      </a:r>
+                      <a:endParaRPr sz="1800" dirty="0"/>
+                    </a:p>
+                  </a:txBody>
+                  <a:tcPr marL="91450" marR="91450" marT="45725" marB="45725"/>
+                </a:tc>
+                <a:tc>
+                  <a:txBody>
+                    <a:bodyPr/>
+                    <a:lstStyle/>
+                    <a:p>
+                      <a:pPr marL="0" marR="0" lvl="0" indent="0" algn="l" rtl="0">
+                        <a:lnSpc>
+                          <a:spcPct val="100000"/>
+                        </a:lnSpc>
+                        <a:spcBef>
+                          <a:spcPts val="0"/>
+                        </a:spcBef>
+                        <a:spcAft>
+                          <a:spcPts val="0"/>
+                        </a:spcAft>
+                        <a:buClr>
+                          <a:schemeClr val="lt1"/>
+                        </a:buClr>
+                        <a:buSzPts val="1800"/>
+                        <a:buFont typeface="Century Gothic"/>
+                        <a:buNone/>
+                      </a:pPr>
+                      <a:r>
+                        <a:rPr lang="en-US" sz="1800"/>
+                        <a:t>Completed </a:t>
+                      </a:r>
+                      <a:endParaRPr sz="1800"/>
+                    </a:p>
+                  </a:txBody>
+                  <a:tcPr marL="91450" marR="91450" marT="45725" marB="45725"/>
+                </a:tc>
+                <a:tc>
+                  <a:txBody>
+                    <a:bodyPr/>
+                    <a:lstStyle/>
+                    <a:p>
+                      <a:pPr marL="0" marR="0" lvl="0" indent="0" algn="l" rtl="0">
+                        <a:spcBef>
+                          <a:spcPts val="0"/>
+                        </a:spcBef>
+                        <a:spcAft>
+                          <a:spcPts val="0"/>
+                        </a:spcAft>
+                        <a:buNone/>
+                      </a:pPr>
+                      <a:r>
+                        <a:rPr lang="en-CA" sz="1800" dirty="0"/>
+                        <a:t>Group Meeting</a:t>
+                      </a:r>
+                    </a:p>
+                  </a:txBody>
+                  <a:tcPr marL="91450" marR="91450" marT="45725" marB="45725"/>
+                </a:tc>
+                <a:tc>
+                  <a:txBody>
+                    <a:bodyPr/>
+                    <a:lstStyle/>
+                    <a:p>
+                      <a:pPr marL="0" marR="0" lvl="0" indent="0" algn="l" rtl="0">
+                        <a:spcBef>
+                          <a:spcPts val="0"/>
+                        </a:spcBef>
+                        <a:spcAft>
+                          <a:spcPts val="0"/>
+                        </a:spcAft>
+                        <a:buNone/>
+                      </a:pPr>
+                      <a:endParaRPr sz="1800"/>
+                    </a:p>
+                  </a:txBody>
+                  <a:tcPr marL="91450" marR="91450" marT="45725" marB="45725"/>
+                </a:tc>
+                <a:extLst>
+                  <a:ext uri="{0D108BD9-81ED-4DB2-BD59-A6C34878D82A}">
+                    <a16:rowId xmlns:a16="http://schemas.microsoft.com/office/drawing/2014/main" val="2231727306"/>
+                  </a:ext>
+                </a:extLst>
+              </a:tr>
+              <a:tr h="382298">
+                <a:tc>
+                  <a:txBody>
+                    <a:bodyPr/>
+                    <a:lstStyle/>
+                    <a:p>
+                      <a:pPr marL="0" marR="0" lvl="0" indent="0" algn="l" rtl="0">
+                        <a:spcBef>
+                          <a:spcPts val="0"/>
+                        </a:spcBef>
+                        <a:spcAft>
+                          <a:spcPts val="0"/>
+                        </a:spcAft>
+                        <a:buNone/>
+                      </a:pPr>
+                      <a:r>
+                        <a:rPr lang="en-US" sz="1800" dirty="0"/>
+                        <a:t>ER Diagram</a:t>
+                      </a:r>
+                      <a:endParaRPr sz="1800" dirty="0"/>
+                    </a:p>
+                  </a:txBody>
+                  <a:tcPr marL="91450" marR="91450" marT="45725" marB="45725"/>
+                </a:tc>
+                <a:tc>
+                  <a:txBody>
+                    <a:bodyPr/>
+                    <a:lstStyle/>
+                    <a:p>
+                      <a:pPr marL="0" marR="0" lvl="0" indent="0" algn="l" rtl="0">
+                        <a:lnSpc>
+                          <a:spcPct val="100000"/>
+                        </a:lnSpc>
+                        <a:spcBef>
+                          <a:spcPts val="0"/>
+                        </a:spcBef>
+                        <a:spcAft>
+                          <a:spcPts val="0"/>
+                        </a:spcAft>
+                        <a:buClr>
+                          <a:schemeClr val="lt1"/>
+                        </a:buClr>
+                        <a:buSzPts val="1800"/>
+                        <a:buFont typeface="Century Gothic"/>
+                        <a:buNone/>
+                      </a:pPr>
+                      <a:r>
+                        <a:rPr lang="en-US" sz="1800"/>
+                        <a:t>Completed </a:t>
+                      </a:r>
+                      <a:endParaRPr sz="1800"/>
+                    </a:p>
+                  </a:txBody>
+                  <a:tcPr marL="91450" marR="91450" marT="45725" marB="45725"/>
+                </a:tc>
+                <a:tc>
+                  <a:txBody>
+                    <a:bodyPr/>
+                    <a:lstStyle/>
+                    <a:p>
+                      <a:pPr marL="0" marR="0" lvl="0" indent="0" algn="l" rtl="0">
+                        <a:spcBef>
+                          <a:spcPts val="0"/>
+                        </a:spcBef>
+                        <a:spcAft>
+                          <a:spcPts val="0"/>
+                        </a:spcAft>
+                        <a:buNone/>
+                      </a:pPr>
+                      <a:r>
+                        <a:rPr lang="en-CA" sz="1800" dirty="0"/>
+                        <a:t>Group Meeting</a:t>
+                      </a:r>
+                    </a:p>
+                  </a:txBody>
+                  <a:tcPr marL="91450" marR="91450" marT="45725" marB="45725"/>
+                </a:tc>
+                <a:tc>
+                  <a:txBody>
+                    <a:bodyPr/>
+                    <a:lstStyle/>
+                    <a:p>
+                      <a:pPr marL="0" marR="0" lvl="0" indent="0" algn="l" rtl="0">
+                        <a:spcBef>
+                          <a:spcPts val="0"/>
+                        </a:spcBef>
+                        <a:spcAft>
+                          <a:spcPts val="0"/>
+                        </a:spcAft>
+                        <a:buNone/>
+                      </a:pPr>
+                      <a:endParaRPr sz="1800"/>
+                    </a:p>
+                  </a:txBody>
+                  <a:tcPr marL="91450" marR="91450" marT="45725" marB="45725"/>
+                </a:tc>
+                <a:extLst>
+                  <a:ext uri="{0D108BD9-81ED-4DB2-BD59-A6C34878D82A}">
+                    <a16:rowId xmlns:a16="http://schemas.microsoft.com/office/drawing/2014/main" val="256700979"/>
+                  </a:ext>
+                </a:extLst>
+              </a:tr>
+              <a:tr h="659867">
+                <a:tc>
+                  <a:txBody>
+                    <a:bodyPr/>
+                    <a:lstStyle/>
+                    <a:p>
+                      <a:pPr marL="0" marR="0" lvl="0" indent="0" algn="l" rtl="0">
+                        <a:spcBef>
+                          <a:spcPts val="0"/>
+                        </a:spcBef>
+                        <a:spcAft>
+                          <a:spcPts val="0"/>
+                        </a:spcAft>
+                        <a:buNone/>
+                      </a:pPr>
+                      <a:r>
+                        <a:rPr lang="en-CA" sz="1800" dirty="0"/>
+                        <a:t>Logical Data Model</a:t>
+                      </a:r>
+                      <a:endParaRPr sz="1800" dirty="0"/>
+                    </a:p>
+                  </a:txBody>
+                  <a:tcPr marL="91450" marR="91450" marT="45725" marB="45725"/>
+                </a:tc>
+                <a:tc>
+                  <a:txBody>
+                    <a:bodyPr/>
+                    <a:lstStyle/>
+                    <a:p>
+                      <a:pPr marL="0" marR="0" lvl="0" indent="0" algn="l" rtl="0">
+                        <a:lnSpc>
+                          <a:spcPct val="100000"/>
+                        </a:lnSpc>
+                        <a:spcBef>
+                          <a:spcPts val="0"/>
+                        </a:spcBef>
+                        <a:spcAft>
+                          <a:spcPts val="0"/>
+                        </a:spcAft>
+                        <a:buClr>
+                          <a:schemeClr val="lt1"/>
+                        </a:buClr>
+                        <a:buSzPts val="1800"/>
+                        <a:buFont typeface="Century Gothic"/>
+                        <a:buNone/>
+                      </a:pPr>
+                      <a:r>
+                        <a:rPr lang="en-CA" sz="1800" dirty="0"/>
+                        <a:t>Completed</a:t>
+                      </a:r>
+                      <a:endParaRPr sz="1800" dirty="0"/>
+                    </a:p>
+                  </a:txBody>
+                  <a:tcPr marL="91450" marR="91450" marT="45725" marB="45725"/>
+                </a:tc>
+                <a:tc>
+                  <a:txBody>
+                    <a:bodyPr/>
+                    <a:lstStyle/>
+                    <a:p>
+                      <a:pPr marL="0" marR="0" lvl="0" indent="0" algn="l" rtl="0">
+                        <a:spcBef>
+                          <a:spcPts val="0"/>
+                        </a:spcBef>
+                        <a:spcAft>
+                          <a:spcPts val="0"/>
+                        </a:spcAft>
+                        <a:buNone/>
+                      </a:pPr>
+                      <a:r>
+                        <a:rPr lang="en-CA" sz="1800" dirty="0"/>
+                        <a:t>Group Meeting</a:t>
+                      </a:r>
+                    </a:p>
+                  </a:txBody>
+                  <a:tcPr marL="91450" marR="91450" marT="45725" marB="45725"/>
+                </a:tc>
+                <a:tc>
+                  <a:txBody>
+                    <a:bodyPr/>
+                    <a:lstStyle/>
+                    <a:p>
+                      <a:pPr marL="0" marR="0" lvl="0" indent="0" algn="l" rtl="0">
+                        <a:spcBef>
+                          <a:spcPts val="0"/>
+                        </a:spcBef>
+                        <a:spcAft>
+                          <a:spcPts val="0"/>
+                        </a:spcAft>
+                        <a:buNone/>
+                      </a:pPr>
+                      <a:endParaRPr sz="1800" dirty="0"/>
+                    </a:p>
+                  </a:txBody>
+                  <a:tcPr marL="91450" marR="91450" marT="45725" marB="45725"/>
+                </a:tc>
+                <a:extLst>
+                  <a:ext uri="{0D108BD9-81ED-4DB2-BD59-A6C34878D82A}">
+                    <a16:rowId xmlns:a16="http://schemas.microsoft.com/office/drawing/2014/main" val="773851217"/>
+                  </a:ext>
+                </a:extLst>
+              </a:tr>
+              <a:tr h="659857">
+                <a:tc>
+                  <a:txBody>
+                    <a:bodyPr/>
+                    <a:lstStyle/>
+                    <a:p>
+                      <a:r>
+                        <a:rPr lang="en-CA" dirty="0"/>
+                        <a:t>Document Data Model</a:t>
+                      </a:r>
+                    </a:p>
+                  </a:txBody>
+                  <a:tcPr/>
+                </a:tc>
+                <a:tc>
+                  <a:txBody>
+                    <a:bodyPr/>
+                    <a:lstStyle/>
+                    <a:p>
+                      <a:pPr marL="0" marR="0" lvl="0" indent="0" algn="l" defTabSz="457200" rtl="0" eaLnBrk="1" fontAlgn="auto" latinLnBrk="0" hangingPunct="1">
+                        <a:lnSpc>
+                          <a:spcPct val="100000"/>
+                        </a:lnSpc>
+                        <a:spcBef>
+                          <a:spcPts val="0"/>
+                        </a:spcBef>
+                        <a:spcAft>
+                          <a:spcPts val="0"/>
+                        </a:spcAft>
+                        <a:buClrTx/>
+                        <a:buSzTx/>
+                        <a:buFontTx/>
+                        <a:buNone/>
+                        <a:tabLst/>
+                        <a:defRPr/>
+                      </a:pPr>
+                      <a:r>
+                        <a:rPr lang="en-CA" sz="1800" dirty="0"/>
+                        <a:t>Completed</a:t>
+                      </a:r>
+                    </a:p>
+                  </a:txBody>
+                  <a:tcPr/>
+                </a:tc>
+                <a:tc>
+                  <a:txBody>
+                    <a:bodyPr/>
+                    <a:lstStyle/>
+                    <a:p>
+                      <a:pPr marL="0" marR="0" lvl="0" indent="0" algn="l" rtl="0">
+                        <a:spcBef>
+                          <a:spcPts val="0"/>
+                        </a:spcBef>
+                        <a:spcAft>
+                          <a:spcPts val="0"/>
+                        </a:spcAft>
+                        <a:buNone/>
+                      </a:pPr>
+                      <a:r>
+                        <a:rPr lang="en-CA" sz="1800" dirty="0"/>
+                        <a:t>Group Meeting</a:t>
+                      </a:r>
+                    </a:p>
+                  </a:txBody>
+                  <a:tcPr marL="91450" marR="91450" marT="45725" marB="45725"/>
+                </a:tc>
+                <a:tc>
+                  <a:txBody>
+                    <a:bodyPr/>
+                    <a:lstStyle/>
+                    <a:p>
+                      <a:endParaRPr lang="en-CA" dirty="0"/>
+                    </a:p>
+                  </a:txBody>
+                  <a:tcPr/>
+                </a:tc>
+                <a:extLst>
+                  <a:ext uri="{0D108BD9-81ED-4DB2-BD59-A6C34878D82A}">
+                    <a16:rowId xmlns:a16="http://schemas.microsoft.com/office/drawing/2014/main" val="375751879"/>
+                  </a:ext>
+                </a:extLst>
+              </a:tr>
+              <a:tr h="382298">
+                <a:tc>
+                  <a:txBody>
+                    <a:bodyPr/>
+                    <a:lstStyle/>
+                    <a:p>
+                      <a:pPr marL="0" marR="0" lvl="0" indent="0" algn="l" rtl="0">
+                        <a:spcBef>
+                          <a:spcPts val="0"/>
+                        </a:spcBef>
+                        <a:spcAft>
+                          <a:spcPts val="0"/>
+                        </a:spcAft>
+                        <a:buNone/>
+                      </a:pPr>
+                      <a:r>
+                        <a:rPr lang="en-US" sz="1800" dirty="0"/>
+                        <a:t>Android design</a:t>
+                      </a:r>
+                      <a:endParaRPr sz="1800" dirty="0"/>
+                    </a:p>
+                  </a:txBody>
+                  <a:tcPr marL="91450" marR="91450" marT="45725" marB="45725"/>
+                </a:tc>
+                <a:tc>
+                  <a:txBody>
+                    <a:bodyPr/>
+                    <a:lstStyle/>
+                    <a:p>
+                      <a:pPr marL="0" marR="0" lvl="0" indent="0" algn="l" rtl="0">
+                        <a:lnSpc>
+                          <a:spcPct val="100000"/>
+                        </a:lnSpc>
+                        <a:spcBef>
+                          <a:spcPts val="0"/>
+                        </a:spcBef>
+                        <a:spcAft>
+                          <a:spcPts val="0"/>
+                        </a:spcAft>
+                        <a:buClr>
+                          <a:schemeClr val="lt1"/>
+                        </a:buClr>
+                        <a:buSzPts val="1800"/>
+                        <a:buFont typeface="Century Gothic"/>
+                        <a:buNone/>
+                      </a:pPr>
+                      <a:r>
+                        <a:rPr lang="en-CA" sz="1800" dirty="0"/>
+                        <a:t>Started</a:t>
+                      </a:r>
+                      <a:endParaRPr sz="1800" dirty="0"/>
+                    </a:p>
+                  </a:txBody>
+                  <a:tcPr marL="91450" marR="91450" marT="45725" marB="45725"/>
+                </a:tc>
+                <a:tc>
+                  <a:txBody>
+                    <a:bodyPr/>
+                    <a:lstStyle/>
+                    <a:p>
+                      <a:pPr marL="0" marR="0" lvl="0" indent="0" algn="l" rtl="0">
+                        <a:spcBef>
+                          <a:spcPts val="0"/>
+                        </a:spcBef>
+                        <a:spcAft>
+                          <a:spcPts val="0"/>
+                        </a:spcAft>
+                        <a:buNone/>
+                      </a:pPr>
+                      <a:r>
+                        <a:rPr lang="en-CA" sz="1800" dirty="0"/>
+                        <a:t>Group Meeting</a:t>
+                      </a:r>
+                    </a:p>
+                  </a:txBody>
+                  <a:tcPr marL="91450" marR="91450" marT="45725" marB="45725"/>
+                </a:tc>
+                <a:tc>
+                  <a:txBody>
+                    <a:bodyPr/>
+                    <a:lstStyle/>
+                    <a:p>
+                      <a:endParaRPr lang="en-CA" dirty="0"/>
+                    </a:p>
+                  </a:txBody>
+                  <a:tcPr/>
+                </a:tc>
+                <a:extLst>
+                  <a:ext uri="{0D108BD9-81ED-4DB2-BD59-A6C34878D82A}">
+                    <a16:rowId xmlns:a16="http://schemas.microsoft.com/office/drawing/2014/main" val="2962590848"/>
+                  </a:ext>
+                </a:extLst>
+              </a:tr>
+            </a:tbl>
+          </a:graphicData>
+        </a:graphic>
+      </p:graphicFrame>
+    </p:spTree>
+    <p:extLst>
+      <p:ext uri="{BB962C8B-B14F-4D97-AF65-F5344CB8AC3E}">
+        <p14:creationId xmlns:p14="http://schemas.microsoft.com/office/powerpoint/2010/main" val="3751487060"/>
       </p:ext>
     </p:extLst>
   </p:cSld>

</xml_diff>